<commit_message>
need finding 2 results checkpoint
</commit_message>
<xml_diff>
--- a/Project3_Presentation_Anthony_and_Melisha.pptx
+++ b/Project3_Presentation_Anthony_and_Melisha.pptx
@@ -3991,7 +3991,7 @@
           <p:nvPr>
             <p:extLst>
               <p:ext uri="{D42A27DB-BD31-4B8C-83A1-F6EECF244321}">
-                <p14:modId xmlns:p14="http://schemas.microsoft.com/office/powerpoint/2010/main" val="2372374473"/>
+                <p14:modId xmlns:p14="http://schemas.microsoft.com/office/powerpoint/2010/main" val="45267036"/>
               </p:ext>
             </p:extLst>
           </p:nvPr>
@@ -4184,51 +4184,66 @@
                     <a:lstStyle/>
                     <a:p>
                       <a:pPr algn="ctr"/>
-                      <a:endParaRPr lang="en-US" dirty="0"/>
-                    </a:p>
-                  </a:txBody>
-                  <a:tcPr/>
-                </a:tc>
-                <a:tc>
-                  <a:txBody>
-                    <a:bodyPr/>
-                    <a:lstStyle/>
-                    <a:p>
-                      <a:pPr algn="ctr"/>
-                      <a:endParaRPr lang="en-US"/>
-                    </a:p>
-                  </a:txBody>
-                  <a:tcPr/>
-                </a:tc>
-                <a:tc>
-                  <a:txBody>
-                    <a:bodyPr/>
-                    <a:lstStyle/>
-                    <a:p>
-                      <a:pPr algn="ctr"/>
-                      <a:endParaRPr lang="en-US"/>
-                    </a:p>
-                  </a:txBody>
-                  <a:tcPr/>
-                </a:tc>
-                <a:tc>
-                  <a:txBody>
-                    <a:bodyPr/>
-                    <a:lstStyle/>
-                    <a:p>
-                      <a:pPr algn="ctr"/>
-                      <a:endParaRPr lang="en-US"/>
-                    </a:p>
-                  </a:txBody>
-                  <a:tcPr/>
-                </a:tc>
-                <a:tc>
-                  <a:txBody>
-                    <a:bodyPr/>
-                    <a:lstStyle/>
-                    <a:p>
-                      <a:pPr algn="ctr"/>
-                      <a:endParaRPr lang="en-US"/>
+                      <a:r>
+                        <a:rPr lang="en-US" dirty="0"/>
+                        <a:t>40</a:t>
+                      </a:r>
+                    </a:p>
+                  </a:txBody>
+                  <a:tcPr/>
+                </a:tc>
+                <a:tc>
+                  <a:txBody>
+                    <a:bodyPr/>
+                    <a:lstStyle/>
+                    <a:p>
+                      <a:pPr algn="ctr"/>
+                      <a:r>
+                        <a:rPr lang="en-US" dirty="0"/>
+                        <a:t>1.000 +/- 0.000</a:t>
+                      </a:r>
+                    </a:p>
+                  </a:txBody>
+                  <a:tcPr/>
+                </a:tc>
+                <a:tc>
+                  <a:txBody>
+                    <a:bodyPr/>
+                    <a:lstStyle/>
+                    <a:p>
+                      <a:pPr algn="ctr"/>
+                      <a:r>
+                        <a:rPr lang="en-US" dirty="0"/>
+                        <a:t>1.46 +/- 0.38</a:t>
+                      </a:r>
+                    </a:p>
+                  </a:txBody>
+                  <a:tcPr/>
+                </a:tc>
+                <a:tc>
+                  <a:txBody>
+                    <a:bodyPr/>
+                    <a:lstStyle/>
+                    <a:p>
+                      <a:pPr algn="ctr"/>
+                      <a:r>
+                        <a:rPr lang="en-US" dirty="0"/>
+                        <a:t>1.000 +/- 0.000</a:t>
+                      </a:r>
+                    </a:p>
+                  </a:txBody>
+                  <a:tcPr/>
+                </a:tc>
+                <a:tc>
+                  <a:txBody>
+                    <a:bodyPr/>
+                    <a:lstStyle/>
+                    <a:p>
+                      <a:pPr algn="ctr"/>
+                      <a:r>
+                        <a:rPr lang="en-US" dirty="0"/>
+                        <a:t>1.927 +/- 0.364</a:t>
+                      </a:r>
                     </a:p>
                   </a:txBody>
                   <a:tcPr/>
@@ -4260,51 +4275,66 @@
                     <a:lstStyle/>
                     <a:p>
                       <a:pPr algn="ctr"/>
-                      <a:endParaRPr lang="en-US"/>
-                    </a:p>
-                  </a:txBody>
-                  <a:tcPr/>
-                </a:tc>
-                <a:tc>
-                  <a:txBody>
-                    <a:bodyPr/>
-                    <a:lstStyle/>
-                    <a:p>
-                      <a:pPr algn="ctr"/>
-                      <a:endParaRPr lang="en-US"/>
-                    </a:p>
-                  </a:txBody>
-                  <a:tcPr/>
-                </a:tc>
-                <a:tc>
-                  <a:txBody>
-                    <a:bodyPr/>
-                    <a:lstStyle/>
-                    <a:p>
-                      <a:pPr algn="ctr"/>
-                      <a:endParaRPr lang="en-US"/>
-                    </a:p>
-                  </a:txBody>
-                  <a:tcPr/>
-                </a:tc>
-                <a:tc>
-                  <a:txBody>
-                    <a:bodyPr/>
-                    <a:lstStyle/>
-                    <a:p>
-                      <a:pPr algn="ctr"/>
-                      <a:endParaRPr lang="en-US"/>
-                    </a:p>
-                  </a:txBody>
-                  <a:tcPr/>
-                </a:tc>
-                <a:tc>
-                  <a:txBody>
-                    <a:bodyPr/>
-                    <a:lstStyle/>
-                    <a:p>
-                      <a:pPr algn="ctr"/>
-                      <a:endParaRPr lang="en-US"/>
+                      <a:r>
+                        <a:rPr lang="en-US" dirty="0"/>
+                        <a:t>40</a:t>
+                      </a:r>
+                    </a:p>
+                  </a:txBody>
+                  <a:tcPr/>
+                </a:tc>
+                <a:tc>
+                  <a:txBody>
+                    <a:bodyPr/>
+                    <a:lstStyle/>
+                    <a:p>
+                      <a:pPr algn="ctr"/>
+                      <a:r>
+                        <a:rPr lang="en-US" dirty="0"/>
+                        <a:t>0.500 +/- 0.577</a:t>
+                      </a:r>
+                    </a:p>
+                  </a:txBody>
+                  <a:tcPr/>
+                </a:tc>
+                <a:tc>
+                  <a:txBody>
+                    <a:bodyPr/>
+                    <a:lstStyle/>
+                    <a:p>
+                      <a:pPr algn="ctr"/>
+                      <a:r>
+                        <a:rPr lang="en-US" dirty="0"/>
+                        <a:t>2.12 +/- 0.55</a:t>
+                      </a:r>
+                    </a:p>
+                  </a:txBody>
+                  <a:tcPr/>
+                </a:tc>
+                <a:tc>
+                  <a:txBody>
+                    <a:bodyPr/>
+                    <a:lstStyle/>
+                    <a:p>
+                      <a:pPr algn="ctr"/>
+                      <a:r>
+                        <a:rPr lang="en-US" dirty="0"/>
+                        <a:t>0.917 +/- 0.282</a:t>
+                      </a:r>
+                    </a:p>
+                  </a:txBody>
+                  <a:tcPr/>
+                </a:tc>
+                <a:tc>
+                  <a:txBody>
+                    <a:bodyPr/>
+                    <a:lstStyle/>
+                    <a:p>
+                      <a:pPr algn="ctr"/>
+                      <a:r>
+                        <a:rPr lang="en-US" dirty="0"/>
+                        <a:t>1.627 +/- 0.336</a:t>
+                      </a:r>
                     </a:p>
                   </a:txBody>
                   <a:tcPr/>
@@ -4336,51 +4366,66 @@
                     <a:lstStyle/>
                     <a:p>
                       <a:pPr algn="ctr"/>
-                      <a:endParaRPr lang="en-US" dirty="0"/>
-                    </a:p>
-                  </a:txBody>
-                  <a:tcPr/>
-                </a:tc>
-                <a:tc>
-                  <a:txBody>
-                    <a:bodyPr/>
-                    <a:lstStyle/>
-                    <a:p>
-                      <a:pPr algn="ctr"/>
-                      <a:endParaRPr lang="en-US" dirty="0"/>
-                    </a:p>
-                  </a:txBody>
-                  <a:tcPr/>
-                </a:tc>
-                <a:tc>
-                  <a:txBody>
-                    <a:bodyPr/>
-                    <a:lstStyle/>
-                    <a:p>
-                      <a:pPr algn="ctr"/>
-                      <a:endParaRPr lang="en-US" dirty="0"/>
-                    </a:p>
-                  </a:txBody>
-                  <a:tcPr/>
-                </a:tc>
-                <a:tc>
-                  <a:txBody>
-                    <a:bodyPr/>
-                    <a:lstStyle/>
-                    <a:p>
-                      <a:pPr algn="ctr"/>
-                      <a:endParaRPr lang="en-US" dirty="0"/>
-                    </a:p>
-                  </a:txBody>
-                  <a:tcPr/>
-                </a:tc>
-                <a:tc>
-                  <a:txBody>
-                    <a:bodyPr/>
-                    <a:lstStyle/>
-                    <a:p>
-                      <a:pPr algn="ctr"/>
-                      <a:endParaRPr lang="en-US" dirty="0"/>
+                      <a:r>
+                        <a:rPr lang="en-US" dirty="0"/>
+                        <a:t>40</a:t>
+                      </a:r>
+                    </a:p>
+                  </a:txBody>
+                  <a:tcPr/>
+                </a:tc>
+                <a:tc>
+                  <a:txBody>
+                    <a:bodyPr/>
+                    <a:lstStyle/>
+                    <a:p>
+                      <a:pPr algn="ctr"/>
+                      <a:r>
+                        <a:rPr lang="en-US" dirty="0"/>
+                        <a:t>0.750 +/- 0.500</a:t>
+                      </a:r>
+                    </a:p>
+                  </a:txBody>
+                  <a:tcPr/>
+                </a:tc>
+                <a:tc>
+                  <a:txBody>
+                    <a:bodyPr/>
+                    <a:lstStyle/>
+                    <a:p>
+                      <a:pPr algn="ctr"/>
+                      <a:r>
+                        <a:rPr lang="en-US" dirty="0"/>
+                        <a:t>1.51 +/- 0.38</a:t>
+                      </a:r>
+                    </a:p>
+                  </a:txBody>
+                  <a:tcPr/>
+                </a:tc>
+                <a:tc>
+                  <a:txBody>
+                    <a:bodyPr/>
+                    <a:lstStyle/>
+                    <a:p>
+                      <a:pPr algn="ctr"/>
+                      <a:r>
+                        <a:rPr lang="en-US" dirty="0"/>
+                        <a:t>0.875 +/- 0.338</a:t>
+                      </a:r>
+                    </a:p>
+                  </a:txBody>
+                  <a:tcPr/>
+                </a:tc>
+                <a:tc>
+                  <a:txBody>
+                    <a:bodyPr/>
+                    <a:lstStyle/>
+                    <a:p>
+                      <a:pPr algn="ctr"/>
+                      <a:r>
+                        <a:rPr lang="en-US" dirty="0"/>
+                        <a:t>1.801 +/- 0.506</a:t>
+                      </a:r>
                     </a:p>
                   </a:txBody>
                   <a:tcPr/>
@@ -4412,6 +4457,10 @@
                     <a:lstStyle/>
                     <a:p>
                       <a:pPr algn="ctr"/>
+                      <a:r>
+                        <a:rPr lang="en-US"/>
+                        <a:t>40</a:t>
+                      </a:r>
                       <a:endParaRPr lang="en-US" dirty="0"/>
                     </a:p>
                   </a:txBody>
@@ -4423,40 +4472,52 @@
                     <a:lstStyle/>
                     <a:p>
                       <a:pPr algn="ctr"/>
-                      <a:endParaRPr lang="en-US" dirty="0"/>
-                    </a:p>
-                  </a:txBody>
-                  <a:tcPr/>
-                </a:tc>
-                <a:tc>
-                  <a:txBody>
-                    <a:bodyPr/>
-                    <a:lstStyle/>
-                    <a:p>
-                      <a:pPr algn="ctr"/>
-                      <a:endParaRPr lang="en-US" dirty="0"/>
-                    </a:p>
-                  </a:txBody>
-                  <a:tcPr/>
-                </a:tc>
-                <a:tc>
-                  <a:txBody>
-                    <a:bodyPr/>
-                    <a:lstStyle/>
-                    <a:p>
-                      <a:pPr algn="ctr"/>
-                      <a:endParaRPr lang="en-US" dirty="0"/>
-                    </a:p>
-                  </a:txBody>
-                  <a:tcPr/>
-                </a:tc>
-                <a:tc>
-                  <a:txBody>
-                    <a:bodyPr/>
-                    <a:lstStyle/>
-                    <a:p>
-                      <a:pPr algn="ctr"/>
-                      <a:endParaRPr lang="en-US" dirty="0"/>
+                      <a:r>
+                        <a:rPr lang="en-US" dirty="0"/>
+                        <a:t>0.750 +/- 0.500</a:t>
+                      </a:r>
+                    </a:p>
+                  </a:txBody>
+                  <a:tcPr/>
+                </a:tc>
+                <a:tc>
+                  <a:txBody>
+                    <a:bodyPr/>
+                    <a:lstStyle/>
+                    <a:p>
+                      <a:pPr algn="ctr"/>
+                      <a:r>
+                        <a:rPr lang="en-US" dirty="0"/>
+                        <a:t>1.55 +/- 0.30</a:t>
+                      </a:r>
+                    </a:p>
+                  </a:txBody>
+                  <a:tcPr/>
+                </a:tc>
+                <a:tc>
+                  <a:txBody>
+                    <a:bodyPr/>
+                    <a:lstStyle/>
+                    <a:p>
+                      <a:pPr algn="ctr"/>
+                      <a:r>
+                        <a:rPr lang="en-US" dirty="0"/>
+                        <a:t>0.958 +/- 0.204</a:t>
+                      </a:r>
+                    </a:p>
+                  </a:txBody>
+                  <a:tcPr/>
+                </a:tc>
+                <a:tc>
+                  <a:txBody>
+                    <a:bodyPr/>
+                    <a:lstStyle/>
+                    <a:p>
+                      <a:pPr algn="ctr"/>
+                      <a:r>
+                        <a:rPr lang="en-US" dirty="0"/>
+                        <a:t>1.552 +/- 0.363</a:t>
+                      </a:r>
                     </a:p>
                   </a:txBody>
                   <a:tcPr/>
@@ -4488,6 +4549,10 @@
                     <a:lstStyle/>
                     <a:p>
                       <a:pPr algn="ctr"/>
+                      <a:r>
+                        <a:rPr lang="en-US"/>
+                        <a:t>40</a:t>
+                      </a:r>
                       <a:endParaRPr lang="en-US" dirty="0"/>
                     </a:p>
                   </a:txBody>
@@ -4499,40 +4564,52 @@
                     <a:lstStyle/>
                     <a:p>
                       <a:pPr algn="ctr"/>
-                      <a:endParaRPr lang="en-US" dirty="0"/>
-                    </a:p>
-                  </a:txBody>
-                  <a:tcPr/>
-                </a:tc>
-                <a:tc>
-                  <a:txBody>
-                    <a:bodyPr/>
-                    <a:lstStyle/>
-                    <a:p>
-                      <a:pPr algn="ctr"/>
-                      <a:endParaRPr lang="en-US" dirty="0"/>
-                    </a:p>
-                  </a:txBody>
-                  <a:tcPr/>
-                </a:tc>
-                <a:tc>
-                  <a:txBody>
-                    <a:bodyPr/>
-                    <a:lstStyle/>
-                    <a:p>
-                      <a:pPr algn="ctr"/>
-                      <a:endParaRPr lang="en-US" dirty="0"/>
-                    </a:p>
-                  </a:txBody>
-                  <a:tcPr/>
-                </a:tc>
-                <a:tc>
-                  <a:txBody>
-                    <a:bodyPr/>
-                    <a:lstStyle/>
-                    <a:p>
-                      <a:pPr algn="ctr"/>
-                      <a:endParaRPr lang="en-US" dirty="0"/>
+                      <a:r>
+                        <a:rPr lang="en-US" dirty="0"/>
+                        <a:t>1.000 +/- 0.000</a:t>
+                      </a:r>
+                    </a:p>
+                  </a:txBody>
+                  <a:tcPr/>
+                </a:tc>
+                <a:tc>
+                  <a:txBody>
+                    <a:bodyPr/>
+                    <a:lstStyle/>
+                    <a:p>
+                      <a:pPr algn="ctr"/>
+                      <a:r>
+                        <a:rPr lang="en-US" dirty="0"/>
+                        <a:t>1.12 +/- 0.04</a:t>
+                      </a:r>
+                    </a:p>
+                  </a:txBody>
+                  <a:tcPr/>
+                </a:tc>
+                <a:tc>
+                  <a:txBody>
+                    <a:bodyPr/>
+                    <a:lstStyle/>
+                    <a:p>
+                      <a:pPr algn="ctr"/>
+                      <a:r>
+                        <a:rPr lang="en-US" dirty="0"/>
+                        <a:t>1.000 +/- 0.000</a:t>
+                      </a:r>
+                    </a:p>
+                  </a:txBody>
+                  <a:tcPr/>
+                </a:tc>
+                <a:tc>
+                  <a:txBody>
+                    <a:bodyPr/>
+                    <a:lstStyle/>
+                    <a:p>
+                      <a:pPr algn="ctr"/>
+                      <a:r>
+                        <a:rPr lang="en-US" dirty="0"/>
+                        <a:t>1.223 +/- 0.355</a:t>
+                      </a:r>
                     </a:p>
                   </a:txBody>
                   <a:tcPr/>
@@ -4564,6 +4641,10 @@
                     <a:lstStyle/>
                     <a:p>
                       <a:pPr algn="ctr"/>
+                      <a:r>
+                        <a:rPr lang="en-US"/>
+                        <a:t>40</a:t>
+                      </a:r>
                       <a:endParaRPr lang="en-US" dirty="0"/>
                     </a:p>
                   </a:txBody>
@@ -4575,40 +4656,52 @@
                     <a:lstStyle/>
                     <a:p>
                       <a:pPr algn="ctr"/>
-                      <a:endParaRPr lang="en-US" dirty="0"/>
-                    </a:p>
-                  </a:txBody>
-                  <a:tcPr/>
-                </a:tc>
-                <a:tc>
-                  <a:txBody>
-                    <a:bodyPr/>
-                    <a:lstStyle/>
-                    <a:p>
-                      <a:pPr algn="ctr"/>
-                      <a:endParaRPr lang="en-US" dirty="0"/>
-                    </a:p>
-                  </a:txBody>
-                  <a:tcPr/>
-                </a:tc>
-                <a:tc>
-                  <a:txBody>
-                    <a:bodyPr/>
-                    <a:lstStyle/>
-                    <a:p>
-                      <a:pPr algn="ctr"/>
-                      <a:endParaRPr lang="en-US" dirty="0"/>
-                    </a:p>
-                  </a:txBody>
-                  <a:tcPr/>
-                </a:tc>
-                <a:tc>
-                  <a:txBody>
-                    <a:bodyPr/>
-                    <a:lstStyle/>
-                    <a:p>
-                      <a:pPr algn="ctr"/>
-                      <a:endParaRPr lang="en-US" dirty="0"/>
+                      <a:r>
+                        <a:rPr lang="en-US" dirty="0"/>
+                        <a:t>1.000 +/- 0.000</a:t>
+                      </a:r>
+                    </a:p>
+                  </a:txBody>
+                  <a:tcPr/>
+                </a:tc>
+                <a:tc>
+                  <a:txBody>
+                    <a:bodyPr/>
+                    <a:lstStyle/>
+                    <a:p>
+                      <a:pPr algn="ctr"/>
+                      <a:r>
+                        <a:rPr lang="en-US" dirty="0"/>
+                        <a:t>1.67 +/- 0.99</a:t>
+                      </a:r>
+                    </a:p>
+                  </a:txBody>
+                  <a:tcPr/>
+                </a:tc>
+                <a:tc>
+                  <a:txBody>
+                    <a:bodyPr/>
+                    <a:lstStyle/>
+                    <a:p>
+                      <a:pPr algn="ctr"/>
+                      <a:r>
+                        <a:rPr lang="en-US" dirty="0"/>
+                        <a:t>1.000 +/- 0.000</a:t>
+                      </a:r>
+                    </a:p>
+                  </a:txBody>
+                  <a:tcPr/>
+                </a:tc>
+                <a:tc>
+                  <a:txBody>
+                    <a:bodyPr/>
+                    <a:lstStyle/>
+                    <a:p>
+                      <a:pPr algn="ctr"/>
+                      <a:r>
+                        <a:rPr lang="en-US" dirty="0"/>
+                        <a:t>1.366 +/- 0.364</a:t>
+                      </a:r>
                     </a:p>
                   </a:txBody>
                   <a:tcPr/>
@@ -4640,51 +4733,66 @@
                     <a:lstStyle/>
                     <a:p>
                       <a:pPr algn="ctr"/>
-                      <a:endParaRPr lang="en-US" dirty="0"/>
-                    </a:p>
-                  </a:txBody>
-                  <a:tcPr/>
-                </a:tc>
-                <a:tc>
-                  <a:txBody>
-                    <a:bodyPr/>
-                    <a:lstStyle/>
-                    <a:p>
-                      <a:pPr algn="ctr"/>
-                      <a:endParaRPr lang="en-US" dirty="0"/>
-                    </a:p>
-                  </a:txBody>
-                  <a:tcPr/>
-                </a:tc>
-                <a:tc>
-                  <a:txBody>
-                    <a:bodyPr/>
-                    <a:lstStyle/>
-                    <a:p>
-                      <a:pPr algn="ctr"/>
-                      <a:endParaRPr lang="en-US" dirty="0"/>
-                    </a:p>
-                  </a:txBody>
-                  <a:tcPr/>
-                </a:tc>
-                <a:tc>
-                  <a:txBody>
-                    <a:bodyPr/>
-                    <a:lstStyle/>
-                    <a:p>
-                      <a:pPr algn="ctr"/>
-                      <a:endParaRPr lang="en-US" dirty="0"/>
-                    </a:p>
-                  </a:txBody>
-                  <a:tcPr/>
-                </a:tc>
-                <a:tc>
-                  <a:txBody>
-                    <a:bodyPr/>
-                    <a:lstStyle/>
-                    <a:p>
-                      <a:pPr algn="ctr"/>
-                      <a:endParaRPr lang="en-US" dirty="0"/>
+                      <a:r>
+                        <a:rPr lang="en-US" dirty="0"/>
+                        <a:t>40</a:t>
+                      </a:r>
+                    </a:p>
+                  </a:txBody>
+                  <a:tcPr/>
+                </a:tc>
+                <a:tc>
+                  <a:txBody>
+                    <a:bodyPr/>
+                    <a:lstStyle/>
+                    <a:p>
+                      <a:pPr algn="ctr"/>
+                      <a:r>
+                        <a:rPr lang="en-US" dirty="0"/>
+                        <a:t>1.000 +/- 0.000</a:t>
+                      </a:r>
+                    </a:p>
+                  </a:txBody>
+                  <a:tcPr/>
+                </a:tc>
+                <a:tc>
+                  <a:txBody>
+                    <a:bodyPr/>
+                    <a:lstStyle/>
+                    <a:p>
+                      <a:pPr algn="ctr"/>
+                      <a:r>
+                        <a:rPr lang="en-US" dirty="0"/>
+                        <a:t>1.55 +/- 0.29</a:t>
+                      </a:r>
+                    </a:p>
+                  </a:txBody>
+                  <a:tcPr/>
+                </a:tc>
+                <a:tc>
+                  <a:txBody>
+                    <a:bodyPr/>
+                    <a:lstStyle/>
+                    <a:p>
+                      <a:pPr algn="ctr"/>
+                      <a:r>
+                        <a:rPr lang="en-US" dirty="0"/>
+                        <a:t>1.000 +/- 0.000</a:t>
+                      </a:r>
+                    </a:p>
+                  </a:txBody>
+                  <a:tcPr/>
+                </a:tc>
+                <a:tc>
+                  <a:txBody>
+                    <a:bodyPr/>
+                    <a:lstStyle/>
+                    <a:p>
+                      <a:pPr algn="ctr"/>
+                      <a:r>
+                        <a:rPr lang="en-US" dirty="0"/>
+                        <a:t>1.500 +/- 0.331</a:t>
+                      </a:r>
                     </a:p>
                   </a:txBody>
                   <a:tcPr/>
@@ -9700,7 +9808,7 @@
           <p:nvPr>
             <p:extLst>
               <p:ext uri="{D42A27DB-BD31-4B8C-83A1-F6EECF244321}">
-                <p14:modId xmlns:p14="http://schemas.microsoft.com/office/powerpoint/2010/main" val="2027199347"/>
+                <p14:modId xmlns:p14="http://schemas.microsoft.com/office/powerpoint/2010/main" val="1022737475"/>
               </p:ext>
             </p:extLst>
           </p:nvPr>
@@ -9825,29 +9933,38 @@
                     <a:lstStyle/>
                     <a:p>
                       <a:pPr algn="ctr"/>
-                      <a:endParaRPr lang="en-US"/>
-                    </a:p>
-                  </a:txBody>
-                  <a:tcPr/>
-                </a:tc>
-                <a:tc>
-                  <a:txBody>
-                    <a:bodyPr/>
-                    <a:lstStyle/>
-                    <a:p>
-                      <a:pPr algn="ctr"/>
-                      <a:endParaRPr lang="en-US" dirty="0"/>
-                    </a:p>
-                  </a:txBody>
-                  <a:tcPr/>
-                </a:tc>
-                <a:tc>
-                  <a:txBody>
-                    <a:bodyPr/>
-                    <a:lstStyle/>
-                    <a:p>
-                      <a:pPr algn="ctr"/>
-                      <a:endParaRPr lang="en-US" dirty="0"/>
+                      <a:r>
+                        <a:rPr lang="en-US" dirty="0"/>
+                        <a:t>28</a:t>
+                      </a:r>
+                    </a:p>
+                  </a:txBody>
+                  <a:tcPr/>
+                </a:tc>
+                <a:tc>
+                  <a:txBody>
+                    <a:bodyPr/>
+                    <a:lstStyle/>
+                    <a:p>
+                      <a:pPr algn="ctr"/>
+                      <a:r>
+                        <a:rPr lang="en-US" dirty="0"/>
+                        <a:t>0.857 +/- 0.356</a:t>
+                      </a:r>
+                    </a:p>
+                  </a:txBody>
+                  <a:tcPr/>
+                </a:tc>
+                <a:tc>
+                  <a:txBody>
+                    <a:bodyPr/>
+                    <a:lstStyle/>
+                    <a:p>
+                      <a:pPr algn="ctr"/>
+                      <a:r>
+                        <a:rPr lang="en-US" dirty="0"/>
+                        <a:t>1.57 +/- 0.52</a:t>
+                      </a:r>
                     </a:p>
                   </a:txBody>
                   <a:tcPr/>
@@ -9877,7 +9994,7 @@
           <p:nvPr>
             <p:extLst>
               <p:ext uri="{D42A27DB-BD31-4B8C-83A1-F6EECF244321}">
-                <p14:modId xmlns:p14="http://schemas.microsoft.com/office/powerpoint/2010/main" val="1624668535"/>
+                <p14:modId xmlns:p14="http://schemas.microsoft.com/office/powerpoint/2010/main" val="1005820887"/>
               </p:ext>
             </p:extLst>
           </p:nvPr>
@@ -10002,29 +10119,38 @@
                     <a:lstStyle/>
                     <a:p>
                       <a:pPr algn="ctr"/>
-                      <a:endParaRPr lang="en-US" dirty="0"/>
-                    </a:p>
-                  </a:txBody>
-                  <a:tcPr/>
-                </a:tc>
-                <a:tc>
-                  <a:txBody>
-                    <a:bodyPr/>
-                    <a:lstStyle/>
-                    <a:p>
-                      <a:pPr algn="ctr"/>
-                      <a:endParaRPr lang="en-US" dirty="0"/>
-                    </a:p>
-                  </a:txBody>
-                  <a:tcPr/>
-                </a:tc>
-                <a:tc>
-                  <a:txBody>
-                    <a:bodyPr/>
-                    <a:lstStyle/>
-                    <a:p>
-                      <a:pPr algn="ctr"/>
-                      <a:endParaRPr lang="en-US" dirty="0"/>
+                      <a:r>
+                        <a:rPr lang="en-US" dirty="0"/>
+                        <a:t>168</a:t>
+                      </a:r>
+                    </a:p>
+                  </a:txBody>
+                  <a:tcPr/>
+                </a:tc>
+                <a:tc>
+                  <a:txBody>
+                    <a:bodyPr/>
+                    <a:lstStyle/>
+                    <a:p>
+                      <a:pPr algn="ctr"/>
+                      <a:r>
+                        <a:rPr lang="en-US" dirty="0"/>
+                        <a:t>0.964 +/- 0.186 </a:t>
+                      </a:r>
+                    </a:p>
+                  </a:txBody>
+                  <a:tcPr/>
+                </a:tc>
+                <a:tc>
+                  <a:txBody>
+                    <a:bodyPr/>
+                    <a:lstStyle/>
+                    <a:p>
+                      <a:pPr algn="ctr"/>
+                      <a:r>
+                        <a:rPr lang="en-US" dirty="0"/>
+                        <a:t>1.57 +/- 0.43</a:t>
+                      </a:r>
                     </a:p>
                   </a:txBody>
                   <a:tcPr/>

</xml_diff>